<commit_message>
Update documentation for LinkedIn Feature
</commit_message>
<xml_diff>
--- a/docs/diagrams/LoopsDiagram.pptx
+++ b/docs/diagrams/LoopsDiagram.pptx
@@ -6,6 +6,8 @@
   </p:sldMasterIdLst>
   <p:sldIdLst>
     <p:sldId id="256" r:id="rId2"/>
+    <p:sldId id="257" r:id="rId3"/>
+    <p:sldId id="258" r:id="rId4"/>
   </p:sldIdLst>
   <p:sldSz cx="12192000" cy="6858000"/>
   <p:notesSz cx="6858000" cy="9144000"/>
@@ -104,6 +106,11 @@
       </a:defRPr>
     </a:lvl9pPr>
   </p:defaultTextStyle>
+  <p:extLst>
+    <p:ext uri="{EFAFB233-063F-42B5-8137-9DF3F51BA10A}">
+      <p15:sldGuideLst xmlns:p15="http://schemas.microsoft.com/office/powerpoint/2012/main"/>
+    </p:ext>
+  </p:extLst>
 </p:presentation>
 </file>
 
@@ -238,7 +245,7 @@
           <a:p>
             <a:fld id="{1615473D-C098-2449-908A-A9667E20401B}" type="datetimeFigureOut">
               <a:rPr lang="en-US" smtClean="0"/>
-              <a:t>10/25/17</a:t>
+              <a:t>11/2/17</a:t>
             </a:fld>
             <a:endParaRPr lang="en-US"/>
           </a:p>
@@ -408,7 +415,7 @@
           <a:p>
             <a:fld id="{1615473D-C098-2449-908A-A9667E20401B}" type="datetimeFigureOut">
               <a:rPr lang="en-US" smtClean="0"/>
-              <a:t>10/25/17</a:t>
+              <a:t>11/2/17</a:t>
             </a:fld>
             <a:endParaRPr lang="en-US"/>
           </a:p>
@@ -588,7 +595,7 @@
           <a:p>
             <a:fld id="{1615473D-C098-2449-908A-A9667E20401B}" type="datetimeFigureOut">
               <a:rPr lang="en-US" smtClean="0"/>
-              <a:t>10/25/17</a:t>
+              <a:t>11/2/17</a:t>
             </a:fld>
             <a:endParaRPr lang="en-US"/>
           </a:p>
@@ -758,7 +765,7 @@
           <a:p>
             <a:fld id="{1615473D-C098-2449-908A-A9667E20401B}" type="datetimeFigureOut">
               <a:rPr lang="en-US" smtClean="0"/>
-              <a:t>10/25/17</a:t>
+              <a:t>11/2/17</a:t>
             </a:fld>
             <a:endParaRPr lang="en-US"/>
           </a:p>
@@ -1004,7 +1011,7 @@
           <a:p>
             <a:fld id="{1615473D-C098-2449-908A-A9667E20401B}" type="datetimeFigureOut">
               <a:rPr lang="en-US" smtClean="0"/>
-              <a:t>10/25/17</a:t>
+              <a:t>11/2/17</a:t>
             </a:fld>
             <a:endParaRPr lang="en-US"/>
           </a:p>
@@ -1236,7 +1243,7 @@
           <a:p>
             <a:fld id="{1615473D-C098-2449-908A-A9667E20401B}" type="datetimeFigureOut">
               <a:rPr lang="en-US" smtClean="0"/>
-              <a:t>10/25/17</a:t>
+              <a:t>11/2/17</a:t>
             </a:fld>
             <a:endParaRPr lang="en-US"/>
           </a:p>
@@ -1603,7 +1610,7 @@
           <a:p>
             <a:fld id="{1615473D-C098-2449-908A-A9667E20401B}" type="datetimeFigureOut">
               <a:rPr lang="en-US" smtClean="0"/>
-              <a:t>10/25/17</a:t>
+              <a:t>11/2/17</a:t>
             </a:fld>
             <a:endParaRPr lang="en-US"/>
           </a:p>
@@ -1721,7 +1728,7 @@
           <a:p>
             <a:fld id="{1615473D-C098-2449-908A-A9667E20401B}" type="datetimeFigureOut">
               <a:rPr lang="en-US" smtClean="0"/>
-              <a:t>10/25/17</a:t>
+              <a:t>11/2/17</a:t>
             </a:fld>
             <a:endParaRPr lang="en-US"/>
           </a:p>
@@ -1816,7 +1823,7 @@
           <a:p>
             <a:fld id="{1615473D-C098-2449-908A-A9667E20401B}" type="datetimeFigureOut">
               <a:rPr lang="en-US" smtClean="0"/>
-              <a:t>10/25/17</a:t>
+              <a:t>11/2/17</a:t>
             </a:fld>
             <a:endParaRPr lang="en-US"/>
           </a:p>
@@ -2093,7 +2100,7 @@
           <a:p>
             <a:fld id="{1615473D-C098-2449-908A-A9667E20401B}" type="datetimeFigureOut">
               <a:rPr lang="en-US" smtClean="0"/>
-              <a:t>10/25/17</a:t>
+              <a:t>11/2/17</a:t>
             </a:fld>
             <a:endParaRPr lang="en-US"/>
           </a:p>
@@ -2346,7 +2353,7 @@
           <a:p>
             <a:fld id="{1615473D-C098-2449-908A-A9667E20401B}" type="datetimeFigureOut">
               <a:rPr lang="en-US" smtClean="0"/>
-              <a:t>10/25/17</a:t>
+              <a:t>11/2/17</a:t>
             </a:fld>
             <a:endParaRPr lang="en-US"/>
           </a:p>
@@ -2559,7 +2566,7 @@
           <a:p>
             <a:fld id="{1615473D-C098-2449-908A-A9667E20401B}" type="datetimeFigureOut">
               <a:rPr lang="en-US" smtClean="0"/>
-              <a:t>10/25/17</a:t>
+              <a:t>11/2/17</a:t>
             </a:fld>
             <a:endParaRPr lang="en-US"/>
           </a:p>
@@ -3141,11 +3148,7 @@
               <a:pPr algn="ctr"/>
               <a:r>
                 <a:rPr lang="en-US" sz="1400" dirty="0" smtClean="0"/>
-                <a:t>For person </a:t>
-              </a:r>
-              <a:r>
-                <a:rPr lang="en-US" sz="1400" smtClean="0"/>
-                <a:t>in address book</a:t>
+                <a:t>For person in address book</a:t>
               </a:r>
               <a:endParaRPr lang="en-US" sz="1400" dirty="0"/>
             </a:p>
@@ -4350,6 +4353,962 @@
     <p:extLst>
       <p:ext uri="{BB962C8B-B14F-4D97-AF65-F5344CB8AC3E}">
         <p14:creationId xmlns:p14="http://schemas.microsoft.com/office/powerpoint/2010/main" val="1175251264"/>
+      </p:ext>
+    </p:extLst>
+  </p:cSld>
+  <p:clrMapOvr>
+    <a:masterClrMapping/>
+  </p:clrMapOvr>
+</p:sld>
+</file>
+
+<file path=ppt/slides/slide2.xml><?xml version="1.0" encoding="utf-8"?>
+<p:sld xmlns:a="http://schemas.openxmlformats.org/drawingml/2006/main" xmlns:r="http://schemas.openxmlformats.org/officeDocument/2006/relationships" xmlns:p="http://schemas.openxmlformats.org/presentationml/2006/main">
+  <p:cSld>
+    <p:spTree>
+      <p:nvGrpSpPr>
+        <p:cNvPr id="1" name=""/>
+        <p:cNvGrpSpPr/>
+        <p:nvPr/>
+      </p:nvGrpSpPr>
+      <p:grpSpPr>
+        <a:xfrm>
+          <a:off x="0" y="0"/>
+          <a:ext cx="0" cy="0"/>
+          <a:chOff x="0" y="0"/>
+          <a:chExt cx="0" cy="0"/>
+        </a:xfrm>
+      </p:grpSpPr>
+      <p:sp>
+        <p:nvSpPr>
+          <p:cNvPr id="27" name="Rounded Rectangle 26"/>
+          <p:cNvSpPr/>
+          <p:nvPr/>
+        </p:nvSpPr>
+        <p:spPr>
+          <a:xfrm>
+            <a:off x="4649820" y="359924"/>
+            <a:ext cx="5068111" cy="1884279"/>
+          </a:xfrm>
+          <a:prstGeom prst="roundRect">
+            <a:avLst/>
+          </a:prstGeom>
+          <a:solidFill>
+            <a:srgbClr val="0070C0">
+              <a:alpha val="53000"/>
+            </a:srgbClr>
+          </a:solidFill>
+          <a:ln>
+            <a:noFill/>
+          </a:ln>
+        </p:spPr>
+        <p:style>
+          <a:lnRef idx="2">
+            <a:schemeClr val="accent1">
+              <a:shade val="50000"/>
+            </a:schemeClr>
+          </a:lnRef>
+          <a:fillRef idx="1">
+            <a:schemeClr val="accent1"/>
+          </a:fillRef>
+          <a:effectRef idx="0">
+            <a:schemeClr val="accent1"/>
+          </a:effectRef>
+          <a:fontRef idx="minor">
+            <a:schemeClr val="lt1"/>
+          </a:fontRef>
+        </p:style>
+        <p:txBody>
+          <a:bodyPr rtlCol="0" anchor="ctr"/>
+          <a:lstStyle/>
+          <a:p>
+            <a:pPr algn="ctr"/>
+            <a:endParaRPr lang="en-US"/>
+          </a:p>
+        </p:txBody>
+      </p:sp>
+      <p:grpSp>
+        <p:nvGrpSpPr>
+          <p:cNvPr id="26" name="Group 25"/>
+          <p:cNvGrpSpPr/>
+          <p:nvPr/>
+        </p:nvGrpSpPr>
+        <p:grpSpPr>
+          <a:xfrm>
+            <a:off x="5175512" y="589987"/>
+            <a:ext cx="3890667" cy="4802984"/>
+            <a:chOff x="5175512" y="589987"/>
+            <a:chExt cx="3890667" cy="4802984"/>
+          </a:xfrm>
+        </p:grpSpPr>
+        <p:sp>
+          <p:nvSpPr>
+            <p:cNvPr id="5" name="Diamond 4"/>
+            <p:cNvSpPr/>
+            <p:nvPr/>
+          </p:nvSpPr>
+          <p:spPr>
+            <a:xfrm>
+              <a:off x="5175512" y="589987"/>
+              <a:ext cx="1562211" cy="1562211"/>
+            </a:xfrm>
+            <a:prstGeom prst="diamond">
+              <a:avLst/>
+            </a:prstGeom>
+            <a:solidFill>
+              <a:srgbClr val="00B050"/>
+            </a:solidFill>
+            <a:ln>
+              <a:noFill/>
+            </a:ln>
+          </p:spPr>
+          <p:style>
+            <a:lnRef idx="2">
+              <a:schemeClr val="accent1">
+                <a:shade val="50000"/>
+              </a:schemeClr>
+            </a:lnRef>
+            <a:fillRef idx="1">
+              <a:schemeClr val="accent1"/>
+            </a:fillRef>
+            <a:effectRef idx="0">
+              <a:schemeClr val="accent1"/>
+            </a:effectRef>
+            <a:fontRef idx="minor">
+              <a:schemeClr val="lt1"/>
+            </a:fontRef>
+          </p:style>
+          <p:txBody>
+            <a:bodyPr rtlCol="0" anchor="ctr"/>
+            <a:lstStyle/>
+            <a:p>
+              <a:pPr algn="ctr"/>
+              <a:r>
+                <a:rPr lang="en-US" sz="1400" dirty="0"/>
+                <a:t>p</a:t>
+              </a:r>
+              <a:r>
+                <a:rPr lang="en-US" sz="1400" dirty="0" smtClean="0"/>
+                <a:t>age </a:t>
+              </a:r>
+            </a:p>
+            <a:p>
+              <a:pPr algn="ctr"/>
+              <a:r>
+                <a:rPr lang="en-US" sz="1400" dirty="0" smtClean="0"/>
+                <a:t>== </a:t>
+              </a:r>
+              <a:r>
+                <a:rPr lang="en-US" sz="1400" dirty="0" err="1"/>
+                <a:t>l</a:t>
+              </a:r>
+              <a:r>
+                <a:rPr lang="en-US" sz="1400" dirty="0" err="1" smtClean="0"/>
+                <a:t>inkedin</a:t>
+              </a:r>
+              <a:endParaRPr lang="en-US" sz="1400" dirty="0"/>
+            </a:p>
+          </p:txBody>
+        </p:sp>
+        <p:cxnSp>
+          <p:nvCxnSpPr>
+            <p:cNvPr id="6" name="Straight Arrow Connector 5"/>
+            <p:cNvCxnSpPr>
+              <a:stCxn id="5" idx="3"/>
+            </p:cNvCxnSpPr>
+            <p:nvPr/>
+          </p:nvCxnSpPr>
+          <p:spPr>
+            <a:xfrm flipV="1">
+              <a:off x="6737723" y="1370583"/>
+              <a:ext cx="898490" cy="510"/>
+            </a:xfrm>
+            <a:prstGeom prst="straightConnector1">
+              <a:avLst/>
+            </a:prstGeom>
+            <a:ln>
+              <a:tailEnd type="triangle"/>
+            </a:ln>
+          </p:spPr>
+          <p:style>
+            <a:lnRef idx="1">
+              <a:schemeClr val="dk1"/>
+            </a:lnRef>
+            <a:fillRef idx="0">
+              <a:schemeClr val="dk1"/>
+            </a:fillRef>
+            <a:effectRef idx="0">
+              <a:schemeClr val="dk1"/>
+            </a:effectRef>
+            <a:fontRef idx="minor">
+              <a:schemeClr val="tx1"/>
+            </a:fontRef>
+          </p:style>
+        </p:cxnSp>
+        <p:cxnSp>
+          <p:nvCxnSpPr>
+            <p:cNvPr id="9" name="Straight Arrow Connector 8"/>
+            <p:cNvCxnSpPr>
+              <a:endCxn id="12" idx="0"/>
+            </p:cNvCxnSpPr>
+            <p:nvPr/>
+          </p:nvCxnSpPr>
+          <p:spPr>
+            <a:xfrm>
+              <a:off x="5956617" y="4169716"/>
+              <a:ext cx="0" cy="746600"/>
+            </a:xfrm>
+            <a:prstGeom prst="straightConnector1">
+              <a:avLst/>
+            </a:prstGeom>
+            <a:ln>
+              <a:tailEnd type="triangle"/>
+            </a:ln>
+          </p:spPr>
+          <p:style>
+            <a:lnRef idx="1">
+              <a:schemeClr val="dk1"/>
+            </a:lnRef>
+            <a:fillRef idx="0">
+              <a:schemeClr val="dk1"/>
+            </a:fillRef>
+            <a:effectRef idx="0">
+              <a:schemeClr val="dk1"/>
+            </a:effectRef>
+            <a:fontRef idx="minor">
+              <a:schemeClr val="tx1"/>
+            </a:fontRef>
+          </p:style>
+        </p:cxnSp>
+        <p:sp>
+          <p:nvSpPr>
+            <p:cNvPr id="11" name="Rounded Rectangle 10"/>
+            <p:cNvSpPr/>
+            <p:nvPr/>
+          </p:nvSpPr>
+          <p:spPr>
+            <a:xfrm>
+              <a:off x="7636213" y="1132255"/>
+              <a:ext cx="1429966" cy="476655"/>
+            </a:xfrm>
+            <a:prstGeom prst="roundRect">
+              <a:avLst/>
+            </a:prstGeom>
+            <a:solidFill>
+              <a:srgbClr val="0070C0"/>
+            </a:solidFill>
+            <a:ln>
+              <a:noFill/>
+            </a:ln>
+          </p:spPr>
+          <p:style>
+            <a:lnRef idx="2">
+              <a:schemeClr val="accent1">
+                <a:shade val="50000"/>
+              </a:schemeClr>
+            </a:lnRef>
+            <a:fillRef idx="1">
+              <a:schemeClr val="accent1"/>
+            </a:fillRef>
+            <a:effectRef idx="0">
+              <a:schemeClr val="accent1"/>
+            </a:effectRef>
+            <a:fontRef idx="minor">
+              <a:schemeClr val="lt1"/>
+            </a:fontRef>
+          </p:style>
+          <p:txBody>
+            <a:bodyPr rtlCol="0" anchor="ctr"/>
+            <a:lstStyle/>
+            <a:p>
+              <a:pPr algn="ctr"/>
+              <a:r>
+                <a:rPr lang="en-US" sz="1000" dirty="0" smtClean="0"/>
+                <a:t>Display </a:t>
+              </a:r>
+              <a:r>
+                <a:rPr lang="en-US" sz="1000" dirty="0" err="1" smtClean="0"/>
+                <a:t>Linkedin</a:t>
+              </a:r>
+              <a:r>
+                <a:rPr lang="en-US" sz="1000" dirty="0" smtClean="0"/>
+                <a:t> profiles</a:t>
+              </a:r>
+              <a:endParaRPr lang="en-US" sz="1000" dirty="0"/>
+            </a:p>
+          </p:txBody>
+        </p:sp>
+        <p:sp>
+          <p:nvSpPr>
+            <p:cNvPr id="12" name="Rounded Rectangle 11"/>
+            <p:cNvSpPr/>
+            <p:nvPr/>
+          </p:nvSpPr>
+          <p:spPr>
+            <a:xfrm>
+              <a:off x="5241634" y="4916316"/>
+              <a:ext cx="1429966" cy="476655"/>
+            </a:xfrm>
+            <a:prstGeom prst="roundRect">
+              <a:avLst/>
+            </a:prstGeom>
+            <a:solidFill>
+              <a:srgbClr val="0070C0"/>
+            </a:solidFill>
+            <a:ln>
+              <a:noFill/>
+            </a:ln>
+          </p:spPr>
+          <p:style>
+            <a:lnRef idx="2">
+              <a:schemeClr val="accent1">
+                <a:shade val="50000"/>
+              </a:schemeClr>
+            </a:lnRef>
+            <a:fillRef idx="1">
+              <a:schemeClr val="accent1"/>
+            </a:fillRef>
+            <a:effectRef idx="0">
+              <a:schemeClr val="accent1"/>
+            </a:effectRef>
+            <a:fontRef idx="minor">
+              <a:schemeClr val="lt1"/>
+            </a:fontRef>
+          </p:style>
+          <p:txBody>
+            <a:bodyPr rtlCol="0" anchor="ctr"/>
+            <a:lstStyle/>
+            <a:p>
+              <a:pPr algn="ctr"/>
+              <a:r>
+                <a:rPr lang="en-US" sz="1200" dirty="0"/>
+                <a:t>Display </a:t>
+              </a:r>
+              <a:r>
+                <a:rPr lang="en-US" sz="1200" dirty="0" smtClean="0"/>
+                <a:t>Google Maps</a:t>
+              </a:r>
+              <a:endParaRPr lang="en-US" sz="1200" dirty="0"/>
+            </a:p>
+          </p:txBody>
+        </p:sp>
+        <p:sp>
+          <p:nvSpPr>
+            <p:cNvPr id="14" name="Diamond 13"/>
+            <p:cNvSpPr/>
+            <p:nvPr/>
+          </p:nvSpPr>
+          <p:spPr>
+            <a:xfrm>
+              <a:off x="5175512" y="2643986"/>
+              <a:ext cx="1562211" cy="1562211"/>
+            </a:xfrm>
+            <a:prstGeom prst="diamond">
+              <a:avLst/>
+            </a:prstGeom>
+            <a:solidFill>
+              <a:srgbClr val="00B050"/>
+            </a:solidFill>
+            <a:ln>
+              <a:noFill/>
+            </a:ln>
+          </p:spPr>
+          <p:style>
+            <a:lnRef idx="2">
+              <a:schemeClr val="accent1">
+                <a:shade val="50000"/>
+              </a:schemeClr>
+            </a:lnRef>
+            <a:fillRef idx="1">
+              <a:schemeClr val="accent1"/>
+            </a:fillRef>
+            <a:effectRef idx="0">
+              <a:schemeClr val="accent1"/>
+            </a:effectRef>
+            <a:fontRef idx="minor">
+              <a:schemeClr val="lt1"/>
+            </a:fontRef>
+          </p:style>
+          <p:txBody>
+            <a:bodyPr rtlCol="0" anchor="ctr"/>
+            <a:lstStyle/>
+            <a:p>
+              <a:pPr algn="ctr"/>
+              <a:r>
+                <a:rPr lang="en-US" sz="1200" dirty="0"/>
+                <a:t>p</a:t>
+              </a:r>
+              <a:r>
+                <a:rPr lang="en-US" sz="1200" dirty="0" smtClean="0"/>
+                <a:t>age </a:t>
+              </a:r>
+            </a:p>
+            <a:p>
+              <a:pPr algn="ctr"/>
+              <a:r>
+                <a:rPr lang="en-US" sz="1200" dirty="0" smtClean="0"/>
+                <a:t>== </a:t>
+              </a:r>
+              <a:r>
+                <a:rPr lang="en-US" sz="1200" dirty="0" err="1" smtClean="0"/>
+                <a:t>facebook</a:t>
+              </a:r>
+              <a:endParaRPr lang="en-US" sz="1200" dirty="0"/>
+            </a:p>
+          </p:txBody>
+        </p:sp>
+        <p:sp>
+          <p:nvSpPr>
+            <p:cNvPr id="19" name="TextBox 18"/>
+            <p:cNvSpPr txBox="1"/>
+            <p:nvPr/>
+          </p:nvSpPr>
+          <p:spPr>
+            <a:xfrm>
+              <a:off x="6852734" y="1066753"/>
+              <a:ext cx="508537" cy="307777"/>
+            </a:xfrm>
+            <a:prstGeom prst="rect">
+              <a:avLst/>
+            </a:prstGeom>
+            <a:noFill/>
+          </p:spPr>
+          <p:txBody>
+            <a:bodyPr wrap="none" rtlCol="0">
+              <a:spAutoFit/>
+            </a:bodyPr>
+            <a:lstStyle/>
+            <a:p>
+              <a:r>
+                <a:rPr lang="en-US" sz="1400" dirty="0" smtClean="0"/>
+                <a:t>True</a:t>
+              </a:r>
+              <a:endParaRPr lang="en-US" sz="1400" dirty="0"/>
+            </a:p>
+          </p:txBody>
+        </p:sp>
+        <p:sp>
+          <p:nvSpPr>
+            <p:cNvPr id="20" name="TextBox 19"/>
+            <p:cNvSpPr txBox="1"/>
+            <p:nvPr/>
+          </p:nvSpPr>
+          <p:spPr>
+            <a:xfrm>
+              <a:off x="6121321" y="2244203"/>
+              <a:ext cx="550279" cy="307777"/>
+            </a:xfrm>
+            <a:prstGeom prst="rect">
+              <a:avLst/>
+            </a:prstGeom>
+            <a:noFill/>
+          </p:spPr>
+          <p:txBody>
+            <a:bodyPr wrap="none" rtlCol="0">
+              <a:spAutoFit/>
+            </a:bodyPr>
+            <a:lstStyle/>
+            <a:p>
+              <a:r>
+                <a:rPr lang="en-US" sz="1400" smtClean="0"/>
+                <a:t>False</a:t>
+              </a:r>
+              <a:endParaRPr lang="en-US" sz="1400"/>
+            </a:p>
+          </p:txBody>
+        </p:sp>
+        <p:cxnSp>
+          <p:nvCxnSpPr>
+            <p:cNvPr id="21" name="Straight Arrow Connector 20"/>
+            <p:cNvCxnSpPr>
+              <a:endCxn id="14" idx="0"/>
+            </p:cNvCxnSpPr>
+            <p:nvPr/>
+          </p:nvCxnSpPr>
+          <p:spPr>
+            <a:xfrm flipH="1">
+              <a:off x="5956618" y="2152198"/>
+              <a:ext cx="45" cy="491788"/>
+            </a:xfrm>
+            <a:prstGeom prst="straightConnector1">
+              <a:avLst/>
+            </a:prstGeom>
+            <a:ln>
+              <a:tailEnd type="triangle"/>
+            </a:ln>
+          </p:spPr>
+          <p:style>
+            <a:lnRef idx="1">
+              <a:schemeClr val="dk1"/>
+            </a:lnRef>
+            <a:fillRef idx="0">
+              <a:schemeClr val="dk1"/>
+            </a:fillRef>
+            <a:effectRef idx="0">
+              <a:schemeClr val="dk1"/>
+            </a:effectRef>
+            <a:fontRef idx="minor">
+              <a:schemeClr val="tx1"/>
+            </a:fontRef>
+          </p:style>
+        </p:cxnSp>
+        <p:sp>
+          <p:nvSpPr>
+            <p:cNvPr id="23" name="Rounded Rectangle 22"/>
+            <p:cNvSpPr/>
+            <p:nvPr/>
+          </p:nvSpPr>
+          <p:spPr>
+            <a:xfrm>
+              <a:off x="7636213" y="3181941"/>
+              <a:ext cx="1429966" cy="476655"/>
+            </a:xfrm>
+            <a:prstGeom prst="roundRect">
+              <a:avLst/>
+            </a:prstGeom>
+            <a:solidFill>
+              <a:srgbClr val="0070C0"/>
+            </a:solidFill>
+            <a:ln>
+              <a:noFill/>
+            </a:ln>
+          </p:spPr>
+          <p:style>
+            <a:lnRef idx="2">
+              <a:schemeClr val="accent1">
+                <a:shade val="50000"/>
+              </a:schemeClr>
+            </a:lnRef>
+            <a:fillRef idx="1">
+              <a:schemeClr val="accent1"/>
+            </a:fillRef>
+            <a:effectRef idx="0">
+              <a:schemeClr val="accent1"/>
+            </a:effectRef>
+            <a:fontRef idx="minor">
+              <a:schemeClr val="lt1"/>
+            </a:fontRef>
+          </p:style>
+          <p:txBody>
+            <a:bodyPr rtlCol="0" anchor="ctr"/>
+            <a:lstStyle/>
+            <a:p>
+              <a:pPr algn="ctr"/>
+              <a:r>
+                <a:rPr lang="en-US" sz="1000" dirty="0" smtClean="0"/>
+                <a:t>Display Facebook profile</a:t>
+              </a:r>
+              <a:endParaRPr lang="en-US" sz="1000" dirty="0"/>
+            </a:p>
+          </p:txBody>
+        </p:sp>
+        <p:sp>
+          <p:nvSpPr>
+            <p:cNvPr id="24" name="TextBox 23"/>
+            <p:cNvSpPr txBox="1"/>
+            <p:nvPr/>
+          </p:nvSpPr>
+          <p:spPr>
+            <a:xfrm>
+              <a:off x="6737723" y="3174412"/>
+              <a:ext cx="508537" cy="307777"/>
+            </a:xfrm>
+            <a:prstGeom prst="rect">
+              <a:avLst/>
+            </a:prstGeom>
+            <a:noFill/>
+          </p:spPr>
+          <p:txBody>
+            <a:bodyPr wrap="none" rtlCol="0">
+              <a:spAutoFit/>
+            </a:bodyPr>
+            <a:lstStyle/>
+            <a:p>
+              <a:r>
+                <a:rPr lang="en-US" sz="1400" smtClean="0"/>
+                <a:t>True</a:t>
+              </a:r>
+              <a:endParaRPr lang="en-US" sz="1400"/>
+            </a:p>
+          </p:txBody>
+        </p:sp>
+        <p:cxnSp>
+          <p:nvCxnSpPr>
+            <p:cNvPr id="25" name="Straight Arrow Connector 24"/>
+            <p:cNvCxnSpPr/>
+            <p:nvPr/>
+          </p:nvCxnSpPr>
+          <p:spPr>
+            <a:xfrm flipV="1">
+              <a:off x="6737723" y="3420269"/>
+              <a:ext cx="898490" cy="510"/>
+            </a:xfrm>
+            <a:prstGeom prst="straightConnector1">
+              <a:avLst/>
+            </a:prstGeom>
+            <a:ln>
+              <a:tailEnd type="triangle"/>
+            </a:ln>
+          </p:spPr>
+          <p:style>
+            <a:lnRef idx="1">
+              <a:schemeClr val="dk1"/>
+            </a:lnRef>
+            <a:fillRef idx="0">
+              <a:schemeClr val="dk1"/>
+            </a:fillRef>
+            <a:effectRef idx="0">
+              <a:schemeClr val="dk1"/>
+            </a:effectRef>
+            <a:fontRef idx="minor">
+              <a:schemeClr val="tx1"/>
+            </a:fontRef>
+          </p:style>
+        </p:cxnSp>
+      </p:grpSp>
+    </p:spTree>
+    <p:extLst>
+      <p:ext uri="{BB962C8B-B14F-4D97-AF65-F5344CB8AC3E}">
+        <p14:creationId xmlns:p14="http://schemas.microsoft.com/office/powerpoint/2010/main" val="717313625"/>
+      </p:ext>
+    </p:extLst>
+  </p:cSld>
+  <p:clrMapOvr>
+    <a:masterClrMapping/>
+  </p:clrMapOvr>
+</p:sld>
+</file>
+
+<file path=ppt/slides/slide3.xml><?xml version="1.0" encoding="utf-8"?>
+<p:sld xmlns:a="http://schemas.openxmlformats.org/drawingml/2006/main" xmlns:r="http://schemas.openxmlformats.org/officeDocument/2006/relationships" xmlns:p="http://schemas.openxmlformats.org/presentationml/2006/main">
+  <p:cSld>
+    <p:spTree>
+      <p:nvGrpSpPr>
+        <p:cNvPr id="1" name=""/>
+        <p:cNvGrpSpPr/>
+        <p:nvPr/>
+      </p:nvGrpSpPr>
+      <p:grpSpPr>
+        <a:xfrm>
+          <a:off x="0" y="0"/>
+          <a:ext cx="0" cy="0"/>
+          <a:chOff x="0" y="0"/>
+          <a:chExt cx="0" cy="0"/>
+        </a:xfrm>
+      </p:grpSpPr>
+      <p:sp>
+        <p:nvSpPr>
+          <p:cNvPr id="5" name="Diamond 4"/>
+          <p:cNvSpPr/>
+          <p:nvPr/>
+        </p:nvSpPr>
+        <p:spPr>
+          <a:xfrm>
+            <a:off x="5175512" y="589987"/>
+            <a:ext cx="1562211" cy="1562211"/>
+          </a:xfrm>
+          <a:prstGeom prst="diamond">
+            <a:avLst/>
+          </a:prstGeom>
+          <a:solidFill>
+            <a:srgbClr val="00B050"/>
+          </a:solidFill>
+          <a:ln>
+            <a:noFill/>
+          </a:ln>
+        </p:spPr>
+        <p:style>
+          <a:lnRef idx="2">
+            <a:schemeClr val="accent1">
+              <a:shade val="50000"/>
+            </a:schemeClr>
+          </a:lnRef>
+          <a:fillRef idx="1">
+            <a:schemeClr val="accent1"/>
+          </a:fillRef>
+          <a:effectRef idx="0">
+            <a:schemeClr val="accent1"/>
+          </a:effectRef>
+          <a:fontRef idx="minor">
+            <a:schemeClr val="lt1"/>
+          </a:fontRef>
+        </p:style>
+        <p:txBody>
+          <a:bodyPr rtlCol="0" anchor="ctr"/>
+          <a:lstStyle/>
+          <a:p>
+            <a:pPr algn="ctr"/>
+            <a:r>
+              <a:rPr lang="en-US" sz="1400" dirty="0"/>
+              <a:t>p</a:t>
+            </a:r>
+            <a:r>
+              <a:rPr lang="en-US" sz="1400" dirty="0" smtClean="0"/>
+              <a:t>age </a:t>
+            </a:r>
+          </a:p>
+          <a:p>
+            <a:pPr algn="ctr"/>
+            <a:r>
+              <a:rPr lang="en-US" sz="1400" dirty="0" smtClean="0"/>
+              <a:t>== </a:t>
+            </a:r>
+            <a:r>
+              <a:rPr lang="en-US" sz="1400" dirty="0" err="1"/>
+              <a:t>l</a:t>
+            </a:r>
+            <a:r>
+              <a:rPr lang="en-US" sz="1400" dirty="0" err="1" smtClean="0"/>
+              <a:t>inkedin</a:t>
+            </a:r>
+            <a:endParaRPr lang="en-US" sz="1400" dirty="0"/>
+          </a:p>
+        </p:txBody>
+      </p:sp>
+      <p:cxnSp>
+        <p:nvCxnSpPr>
+          <p:cNvPr id="6" name="Straight Arrow Connector 5"/>
+          <p:cNvCxnSpPr>
+            <a:stCxn id="5" idx="3"/>
+          </p:cNvCxnSpPr>
+          <p:nvPr/>
+        </p:nvCxnSpPr>
+        <p:spPr>
+          <a:xfrm flipV="1">
+            <a:off x="6737723" y="1370583"/>
+            <a:ext cx="898490" cy="510"/>
+          </a:xfrm>
+          <a:prstGeom prst="straightConnector1">
+            <a:avLst/>
+          </a:prstGeom>
+          <a:ln>
+            <a:tailEnd type="triangle"/>
+          </a:ln>
+        </p:spPr>
+        <p:style>
+          <a:lnRef idx="1">
+            <a:schemeClr val="dk1"/>
+          </a:lnRef>
+          <a:fillRef idx="0">
+            <a:schemeClr val="dk1"/>
+          </a:fillRef>
+          <a:effectRef idx="0">
+            <a:schemeClr val="dk1"/>
+          </a:effectRef>
+          <a:fontRef idx="minor">
+            <a:schemeClr val="tx1"/>
+          </a:fontRef>
+        </p:style>
+      </p:cxnSp>
+      <p:sp>
+        <p:nvSpPr>
+          <p:cNvPr id="11" name="Rounded Rectangle 10"/>
+          <p:cNvSpPr/>
+          <p:nvPr/>
+        </p:nvSpPr>
+        <p:spPr>
+          <a:xfrm>
+            <a:off x="7636213" y="1132255"/>
+            <a:ext cx="1429966" cy="476655"/>
+          </a:xfrm>
+          <a:prstGeom prst="roundRect">
+            <a:avLst/>
+          </a:prstGeom>
+          <a:solidFill>
+            <a:srgbClr val="0070C0"/>
+          </a:solidFill>
+          <a:ln>
+            <a:noFill/>
+          </a:ln>
+        </p:spPr>
+        <p:style>
+          <a:lnRef idx="2">
+            <a:schemeClr val="accent1">
+              <a:shade val="50000"/>
+            </a:schemeClr>
+          </a:lnRef>
+          <a:fillRef idx="1">
+            <a:schemeClr val="accent1"/>
+          </a:fillRef>
+          <a:effectRef idx="0">
+            <a:schemeClr val="accent1"/>
+          </a:effectRef>
+          <a:fontRef idx="minor">
+            <a:schemeClr val="lt1"/>
+          </a:fontRef>
+        </p:style>
+        <p:txBody>
+          <a:bodyPr rtlCol="0" anchor="ctr"/>
+          <a:lstStyle/>
+          <a:p>
+            <a:pPr algn="ctr"/>
+            <a:r>
+              <a:rPr lang="en-US" sz="1000" dirty="0" smtClean="0"/>
+              <a:t>Display </a:t>
+            </a:r>
+            <a:r>
+              <a:rPr lang="en-US" sz="1000" dirty="0" err="1" smtClean="0"/>
+              <a:t>Linkedin</a:t>
+            </a:r>
+            <a:r>
+              <a:rPr lang="en-US" sz="1000" dirty="0" smtClean="0"/>
+              <a:t> profiles</a:t>
+            </a:r>
+            <a:endParaRPr lang="en-US" sz="1000" dirty="0"/>
+          </a:p>
+        </p:txBody>
+      </p:sp>
+      <p:sp>
+        <p:nvSpPr>
+          <p:cNvPr id="12" name="Rounded Rectangle 11"/>
+          <p:cNvSpPr/>
+          <p:nvPr/>
+        </p:nvSpPr>
+        <p:spPr>
+          <a:xfrm>
+            <a:off x="5241634" y="2643985"/>
+            <a:ext cx="1429966" cy="476655"/>
+          </a:xfrm>
+          <a:prstGeom prst="roundRect">
+            <a:avLst/>
+          </a:prstGeom>
+          <a:solidFill>
+            <a:srgbClr val="0070C0"/>
+          </a:solidFill>
+          <a:ln>
+            <a:noFill/>
+          </a:ln>
+        </p:spPr>
+        <p:style>
+          <a:lnRef idx="2">
+            <a:schemeClr val="accent1">
+              <a:shade val="50000"/>
+            </a:schemeClr>
+          </a:lnRef>
+          <a:fillRef idx="1">
+            <a:schemeClr val="accent1"/>
+          </a:fillRef>
+          <a:effectRef idx="0">
+            <a:schemeClr val="accent1"/>
+          </a:effectRef>
+          <a:fontRef idx="minor">
+            <a:schemeClr val="lt1"/>
+          </a:fontRef>
+        </p:style>
+        <p:txBody>
+          <a:bodyPr rtlCol="0" anchor="ctr"/>
+          <a:lstStyle/>
+          <a:p>
+            <a:pPr algn="ctr"/>
+            <a:r>
+              <a:rPr lang="en-US" sz="1200" dirty="0"/>
+              <a:t>Display </a:t>
+            </a:r>
+            <a:r>
+              <a:rPr lang="en-US" sz="1200" dirty="0" smtClean="0"/>
+              <a:t>Google Maps</a:t>
+            </a:r>
+            <a:endParaRPr lang="en-US" sz="1200" dirty="0"/>
+          </a:p>
+        </p:txBody>
+      </p:sp>
+      <p:sp>
+        <p:nvSpPr>
+          <p:cNvPr id="19" name="TextBox 18"/>
+          <p:cNvSpPr txBox="1"/>
+          <p:nvPr/>
+        </p:nvSpPr>
+        <p:spPr>
+          <a:xfrm>
+            <a:off x="6852734" y="1066753"/>
+            <a:ext cx="508537" cy="307777"/>
+          </a:xfrm>
+          <a:prstGeom prst="rect">
+            <a:avLst/>
+          </a:prstGeom>
+          <a:noFill/>
+        </p:spPr>
+        <p:txBody>
+          <a:bodyPr wrap="none" rtlCol="0">
+            <a:spAutoFit/>
+          </a:bodyPr>
+          <a:lstStyle/>
+          <a:p>
+            <a:r>
+              <a:rPr lang="en-US" sz="1400" dirty="0" smtClean="0"/>
+              <a:t>True</a:t>
+            </a:r>
+            <a:endParaRPr lang="en-US" sz="1400" dirty="0"/>
+          </a:p>
+        </p:txBody>
+      </p:sp>
+      <p:sp>
+        <p:nvSpPr>
+          <p:cNvPr id="20" name="TextBox 19"/>
+          <p:cNvSpPr txBox="1"/>
+          <p:nvPr/>
+        </p:nvSpPr>
+        <p:spPr>
+          <a:xfrm>
+            <a:off x="6121321" y="2244203"/>
+            <a:ext cx="550279" cy="307777"/>
+          </a:xfrm>
+          <a:prstGeom prst="rect">
+            <a:avLst/>
+          </a:prstGeom>
+          <a:noFill/>
+        </p:spPr>
+        <p:txBody>
+          <a:bodyPr wrap="none" rtlCol="0">
+            <a:spAutoFit/>
+          </a:bodyPr>
+          <a:lstStyle/>
+          <a:p>
+            <a:r>
+              <a:rPr lang="en-US" sz="1400" smtClean="0"/>
+              <a:t>False</a:t>
+            </a:r>
+            <a:endParaRPr lang="en-US" sz="1400"/>
+          </a:p>
+        </p:txBody>
+      </p:sp>
+      <p:cxnSp>
+        <p:nvCxnSpPr>
+          <p:cNvPr id="21" name="Straight Arrow Connector 20"/>
+          <p:cNvCxnSpPr/>
+          <p:nvPr/>
+        </p:nvCxnSpPr>
+        <p:spPr>
+          <a:xfrm flipH="1">
+            <a:off x="5956618" y="2152198"/>
+            <a:ext cx="45" cy="491788"/>
+          </a:xfrm>
+          <a:prstGeom prst="straightConnector1">
+            <a:avLst/>
+          </a:prstGeom>
+          <a:ln>
+            <a:tailEnd type="triangle"/>
+          </a:ln>
+        </p:spPr>
+        <p:style>
+          <a:lnRef idx="1">
+            <a:schemeClr val="dk1"/>
+          </a:lnRef>
+          <a:fillRef idx="0">
+            <a:schemeClr val="dk1"/>
+          </a:fillRef>
+          <a:effectRef idx="0">
+            <a:schemeClr val="dk1"/>
+          </a:effectRef>
+          <a:fontRef idx="minor">
+            <a:schemeClr val="tx1"/>
+          </a:fontRef>
+        </p:style>
+      </p:cxnSp>
+    </p:spTree>
+    <p:extLst>
+      <p:ext uri="{BB962C8B-B14F-4D97-AF65-F5344CB8AC3E}">
+        <p14:creationId xmlns:p14="http://schemas.microsoft.com/office/powerpoint/2010/main" val="543732986"/>
       </p:ext>
     </p:extLst>
   </p:cSld>

</xml_diff>

<commit_message>
Update diagrams & Add details for Asana Configuration
Update Diagrams for List Most Searched, Add Meeting
Add Asana configuration user guide
TODO: Fill Asana configuration implementation details
</commit_message>
<xml_diff>
--- a/docs/diagrams/LoopsDiagram.pptx
+++ b/docs/diagrams/LoopsDiagram.pptx
@@ -8,6 +8,7 @@
     <p:sldId id="256" r:id="rId2"/>
     <p:sldId id="257" r:id="rId3"/>
     <p:sldId id="258" r:id="rId4"/>
+    <p:sldId id="259" r:id="rId5"/>
   </p:sldIdLst>
   <p:sldSz cx="12192000" cy="6858000"/>
   <p:notesSz cx="6858000" cy="9144000"/>
@@ -245,7 +246,7 @@
           <a:p>
             <a:fld id="{1615473D-C098-2449-908A-A9667E20401B}" type="datetimeFigureOut">
               <a:rPr lang="en-US" smtClean="0"/>
-              <a:t>11/2/17</a:t>
+              <a:t>11/13/17</a:t>
             </a:fld>
             <a:endParaRPr lang="en-US"/>
           </a:p>
@@ -415,7 +416,7 @@
           <a:p>
             <a:fld id="{1615473D-C098-2449-908A-A9667E20401B}" type="datetimeFigureOut">
               <a:rPr lang="en-US" smtClean="0"/>
-              <a:t>11/2/17</a:t>
+              <a:t>11/13/17</a:t>
             </a:fld>
             <a:endParaRPr lang="en-US"/>
           </a:p>
@@ -595,7 +596,7 @@
           <a:p>
             <a:fld id="{1615473D-C098-2449-908A-A9667E20401B}" type="datetimeFigureOut">
               <a:rPr lang="en-US" smtClean="0"/>
-              <a:t>11/2/17</a:t>
+              <a:t>11/13/17</a:t>
             </a:fld>
             <a:endParaRPr lang="en-US"/>
           </a:p>
@@ -765,7 +766,7 @@
           <a:p>
             <a:fld id="{1615473D-C098-2449-908A-A9667E20401B}" type="datetimeFigureOut">
               <a:rPr lang="en-US" smtClean="0"/>
-              <a:t>11/2/17</a:t>
+              <a:t>11/13/17</a:t>
             </a:fld>
             <a:endParaRPr lang="en-US"/>
           </a:p>
@@ -1011,7 +1012,7 @@
           <a:p>
             <a:fld id="{1615473D-C098-2449-908A-A9667E20401B}" type="datetimeFigureOut">
               <a:rPr lang="en-US" smtClean="0"/>
-              <a:t>11/2/17</a:t>
+              <a:t>11/13/17</a:t>
             </a:fld>
             <a:endParaRPr lang="en-US"/>
           </a:p>
@@ -1243,7 +1244,7 @@
           <a:p>
             <a:fld id="{1615473D-C098-2449-908A-A9667E20401B}" type="datetimeFigureOut">
               <a:rPr lang="en-US" smtClean="0"/>
-              <a:t>11/2/17</a:t>
+              <a:t>11/13/17</a:t>
             </a:fld>
             <a:endParaRPr lang="en-US"/>
           </a:p>
@@ -1610,7 +1611,7 @@
           <a:p>
             <a:fld id="{1615473D-C098-2449-908A-A9667E20401B}" type="datetimeFigureOut">
               <a:rPr lang="en-US" smtClean="0"/>
-              <a:t>11/2/17</a:t>
+              <a:t>11/13/17</a:t>
             </a:fld>
             <a:endParaRPr lang="en-US"/>
           </a:p>
@@ -1728,7 +1729,7 @@
           <a:p>
             <a:fld id="{1615473D-C098-2449-908A-A9667E20401B}" type="datetimeFigureOut">
               <a:rPr lang="en-US" smtClean="0"/>
-              <a:t>11/2/17</a:t>
+              <a:t>11/13/17</a:t>
             </a:fld>
             <a:endParaRPr lang="en-US"/>
           </a:p>
@@ -1823,7 +1824,7 @@
           <a:p>
             <a:fld id="{1615473D-C098-2449-908A-A9667E20401B}" type="datetimeFigureOut">
               <a:rPr lang="en-US" smtClean="0"/>
-              <a:t>11/2/17</a:t>
+              <a:t>11/13/17</a:t>
             </a:fld>
             <a:endParaRPr lang="en-US"/>
           </a:p>
@@ -2100,7 +2101,7 @@
           <a:p>
             <a:fld id="{1615473D-C098-2449-908A-A9667E20401B}" type="datetimeFigureOut">
               <a:rPr lang="en-US" smtClean="0"/>
-              <a:t>11/2/17</a:t>
+              <a:t>11/13/17</a:t>
             </a:fld>
             <a:endParaRPr lang="en-US"/>
           </a:p>
@@ -2353,7 +2354,7 @@
           <a:p>
             <a:fld id="{1615473D-C098-2449-908A-A9667E20401B}" type="datetimeFigureOut">
               <a:rPr lang="en-US" smtClean="0"/>
-              <a:t>11/2/17</a:t>
+              <a:t>11/13/17</a:t>
             </a:fld>
             <a:endParaRPr lang="en-US"/>
           </a:p>
@@ -2566,7 +2567,7 @@
           <a:p>
             <a:fld id="{1615473D-C098-2449-908A-A9667E20401B}" type="datetimeFigureOut">
               <a:rPr lang="en-US" smtClean="0"/>
-              <a:t>11/2/17</a:t>
+              <a:t>11/13/17</a:t>
             </a:fld>
             <a:endParaRPr lang="en-US"/>
           </a:p>
@@ -4686,7 +4687,7 @@
               </a:r>
               <a:r>
                 <a:rPr lang="en-US" sz="1200" dirty="0" smtClean="0"/>
-                <a:t>Google Maps</a:t>
+                <a:t>Google Search results</a:t>
               </a:r>
               <a:endParaRPr lang="en-US" sz="1200" dirty="0"/>
             </a:p>
@@ -4750,8 +4751,8 @@
                 <a:t>== </a:t>
               </a:r>
               <a:r>
-                <a:rPr lang="en-US" sz="1200" dirty="0" err="1" smtClean="0"/>
-                <a:t>facebook</a:t>
+                <a:rPr lang="en-US" sz="1200" dirty="0" smtClean="0"/>
+                <a:t>google maps</a:t>
               </a:r>
               <a:endParaRPr lang="en-US" sz="1200" dirty="0"/>
             </a:p>
@@ -4896,7 +4897,15 @@
               <a:pPr algn="ctr"/>
               <a:r>
                 <a:rPr lang="en-US" sz="1000" dirty="0" smtClean="0"/>
-                <a:t>Display Facebook profile</a:t>
+                <a:t>Display </a:t>
+              </a:r>
+              <a:r>
+                <a:rPr lang="en-US" sz="1000" dirty="0" smtClean="0"/>
+                <a:t>Google</a:t>
+              </a:r>
+              <a:r>
+                <a:rPr lang="en-US" sz="1000" dirty="0" smtClean="0"/>
+                <a:t> Maps</a:t>
               </a:r>
               <a:endParaRPr lang="en-US" sz="1000" dirty="0"/>
             </a:p>
@@ -5309,6 +5318,631 @@
     <p:extLst>
       <p:ext uri="{BB962C8B-B14F-4D97-AF65-F5344CB8AC3E}">
         <p14:creationId xmlns:p14="http://schemas.microsoft.com/office/powerpoint/2010/main" val="543732986"/>
+      </p:ext>
+    </p:extLst>
+  </p:cSld>
+  <p:clrMapOvr>
+    <a:masterClrMapping/>
+  </p:clrMapOvr>
+</p:sld>
+</file>
+
+<file path=ppt/slides/slide4.xml><?xml version="1.0" encoding="utf-8"?>
+<p:sld xmlns:a="http://schemas.openxmlformats.org/drawingml/2006/main" xmlns:r="http://schemas.openxmlformats.org/officeDocument/2006/relationships" xmlns:p="http://schemas.openxmlformats.org/presentationml/2006/main">
+  <p:cSld>
+    <p:spTree>
+      <p:nvGrpSpPr>
+        <p:cNvPr id="1" name=""/>
+        <p:cNvGrpSpPr/>
+        <p:nvPr/>
+      </p:nvGrpSpPr>
+      <p:grpSpPr>
+        <a:xfrm>
+          <a:off x="0" y="0"/>
+          <a:ext cx="0" cy="0"/>
+          <a:chOff x="0" y="0"/>
+          <a:chExt cx="0" cy="0"/>
+        </a:xfrm>
+      </p:grpSpPr>
+      <p:sp>
+        <p:nvSpPr>
+          <p:cNvPr id="4" name="Rounded Rectangle 3"/>
+          <p:cNvSpPr/>
+          <p:nvPr/>
+        </p:nvSpPr>
+        <p:spPr>
+          <a:xfrm>
+            <a:off x="4649820" y="359924"/>
+            <a:ext cx="5068111" cy="1884279"/>
+          </a:xfrm>
+          <a:prstGeom prst="roundRect">
+            <a:avLst/>
+          </a:prstGeom>
+          <a:solidFill>
+            <a:srgbClr val="0070C0">
+              <a:alpha val="53000"/>
+            </a:srgbClr>
+          </a:solidFill>
+          <a:ln>
+            <a:noFill/>
+          </a:ln>
+        </p:spPr>
+        <p:style>
+          <a:lnRef idx="2">
+            <a:schemeClr val="accent1">
+              <a:shade val="50000"/>
+            </a:schemeClr>
+          </a:lnRef>
+          <a:fillRef idx="1">
+            <a:schemeClr val="accent1"/>
+          </a:fillRef>
+          <a:effectRef idx="0">
+            <a:schemeClr val="accent1"/>
+          </a:effectRef>
+          <a:fontRef idx="minor">
+            <a:schemeClr val="lt1"/>
+          </a:fontRef>
+        </p:style>
+        <p:txBody>
+          <a:bodyPr rtlCol="0" anchor="ctr"/>
+          <a:lstStyle/>
+          <a:p>
+            <a:pPr algn="ctr"/>
+            <a:endParaRPr lang="en-US"/>
+          </a:p>
+        </p:txBody>
+      </p:sp>
+      <p:grpSp>
+        <p:nvGrpSpPr>
+          <p:cNvPr id="5" name="Group 4"/>
+          <p:cNvGrpSpPr/>
+          <p:nvPr/>
+        </p:nvGrpSpPr>
+        <p:grpSpPr>
+          <a:xfrm>
+            <a:off x="5175512" y="589987"/>
+            <a:ext cx="3890667" cy="4802984"/>
+            <a:chOff x="5175512" y="589987"/>
+            <a:chExt cx="3890667" cy="4802984"/>
+          </a:xfrm>
+        </p:grpSpPr>
+        <p:sp>
+          <p:nvSpPr>
+            <p:cNvPr id="6" name="Diamond 5"/>
+            <p:cNvSpPr/>
+            <p:nvPr/>
+          </p:nvSpPr>
+          <p:spPr>
+            <a:xfrm>
+              <a:off x="5175512" y="589987"/>
+              <a:ext cx="1562211" cy="1562211"/>
+            </a:xfrm>
+            <a:prstGeom prst="diamond">
+              <a:avLst/>
+            </a:prstGeom>
+            <a:solidFill>
+              <a:srgbClr val="00B050"/>
+            </a:solidFill>
+            <a:ln>
+              <a:noFill/>
+            </a:ln>
+          </p:spPr>
+          <p:style>
+            <a:lnRef idx="2">
+              <a:schemeClr val="accent1">
+                <a:shade val="50000"/>
+              </a:schemeClr>
+            </a:lnRef>
+            <a:fillRef idx="1">
+              <a:schemeClr val="accent1"/>
+            </a:fillRef>
+            <a:effectRef idx="0">
+              <a:schemeClr val="accent1"/>
+            </a:effectRef>
+            <a:fontRef idx="minor">
+              <a:schemeClr val="lt1"/>
+            </a:fontRef>
+          </p:style>
+          <p:txBody>
+            <a:bodyPr rtlCol="0" anchor="ctr"/>
+            <a:lstStyle/>
+            <a:p>
+              <a:pPr algn="ctr"/>
+              <a:r>
+                <a:rPr lang="en-US" sz="1400" dirty="0"/>
+                <a:t>p</a:t>
+              </a:r>
+              <a:r>
+                <a:rPr lang="en-US" sz="1400" dirty="0" smtClean="0"/>
+                <a:t>age </a:t>
+              </a:r>
+            </a:p>
+            <a:p>
+              <a:pPr algn="ctr"/>
+              <a:r>
+                <a:rPr lang="en-US" sz="1400" dirty="0" smtClean="0"/>
+                <a:t>== </a:t>
+              </a:r>
+              <a:r>
+                <a:rPr lang="en-US" sz="1400" dirty="0" err="1"/>
+                <a:t>l</a:t>
+              </a:r>
+              <a:r>
+                <a:rPr lang="en-US" sz="1400" dirty="0" err="1" smtClean="0"/>
+                <a:t>inkedin</a:t>
+              </a:r>
+              <a:endParaRPr lang="en-US" sz="1400" dirty="0"/>
+            </a:p>
+          </p:txBody>
+        </p:sp>
+        <p:cxnSp>
+          <p:nvCxnSpPr>
+            <p:cNvPr id="7" name="Straight Arrow Connector 6"/>
+            <p:cNvCxnSpPr>
+              <a:stCxn id="7" idx="3"/>
+            </p:cNvCxnSpPr>
+            <p:nvPr/>
+          </p:nvCxnSpPr>
+          <p:spPr>
+            <a:xfrm flipV="1">
+              <a:off x="6737723" y="1370583"/>
+              <a:ext cx="898490" cy="510"/>
+            </a:xfrm>
+            <a:prstGeom prst="straightConnector1">
+              <a:avLst/>
+            </a:prstGeom>
+            <a:ln>
+              <a:tailEnd type="triangle"/>
+            </a:ln>
+          </p:spPr>
+          <p:style>
+            <a:lnRef idx="1">
+              <a:schemeClr val="dk1"/>
+            </a:lnRef>
+            <a:fillRef idx="0">
+              <a:schemeClr val="dk1"/>
+            </a:fillRef>
+            <a:effectRef idx="0">
+              <a:schemeClr val="dk1"/>
+            </a:effectRef>
+            <a:fontRef idx="minor">
+              <a:schemeClr val="tx1"/>
+            </a:fontRef>
+          </p:style>
+        </p:cxnSp>
+        <p:cxnSp>
+          <p:nvCxnSpPr>
+            <p:cNvPr id="8" name="Straight Arrow Connector 7"/>
+            <p:cNvCxnSpPr>
+              <a:endCxn id="14" idx="0"/>
+            </p:cNvCxnSpPr>
+            <p:nvPr/>
+          </p:nvCxnSpPr>
+          <p:spPr>
+            <a:xfrm>
+              <a:off x="5956617" y="4169716"/>
+              <a:ext cx="0" cy="746600"/>
+            </a:xfrm>
+            <a:prstGeom prst="straightConnector1">
+              <a:avLst/>
+            </a:prstGeom>
+            <a:ln>
+              <a:tailEnd type="triangle"/>
+            </a:ln>
+          </p:spPr>
+          <p:style>
+            <a:lnRef idx="1">
+              <a:schemeClr val="dk1"/>
+            </a:lnRef>
+            <a:fillRef idx="0">
+              <a:schemeClr val="dk1"/>
+            </a:fillRef>
+            <a:effectRef idx="0">
+              <a:schemeClr val="dk1"/>
+            </a:effectRef>
+            <a:fontRef idx="minor">
+              <a:schemeClr val="tx1"/>
+            </a:fontRef>
+          </p:style>
+        </p:cxnSp>
+        <p:sp>
+          <p:nvSpPr>
+            <p:cNvPr id="9" name="Rounded Rectangle 8"/>
+            <p:cNvSpPr/>
+            <p:nvPr/>
+          </p:nvSpPr>
+          <p:spPr>
+            <a:xfrm>
+              <a:off x="7636213" y="1132255"/>
+              <a:ext cx="1429966" cy="476655"/>
+            </a:xfrm>
+            <a:prstGeom prst="roundRect">
+              <a:avLst/>
+            </a:prstGeom>
+            <a:solidFill>
+              <a:srgbClr val="0070C0"/>
+            </a:solidFill>
+            <a:ln>
+              <a:noFill/>
+            </a:ln>
+          </p:spPr>
+          <p:style>
+            <a:lnRef idx="2">
+              <a:schemeClr val="accent1">
+                <a:shade val="50000"/>
+              </a:schemeClr>
+            </a:lnRef>
+            <a:fillRef idx="1">
+              <a:schemeClr val="accent1"/>
+            </a:fillRef>
+            <a:effectRef idx="0">
+              <a:schemeClr val="accent1"/>
+            </a:effectRef>
+            <a:fontRef idx="minor">
+              <a:schemeClr val="lt1"/>
+            </a:fontRef>
+          </p:style>
+          <p:txBody>
+            <a:bodyPr rtlCol="0" anchor="ctr"/>
+            <a:lstStyle/>
+            <a:p>
+              <a:pPr algn="ctr"/>
+              <a:r>
+                <a:rPr lang="en-US" sz="1000" dirty="0" smtClean="0"/>
+                <a:t>Display </a:t>
+              </a:r>
+              <a:r>
+                <a:rPr lang="en-US" sz="1000" dirty="0" err="1" smtClean="0"/>
+                <a:t>Linkedin</a:t>
+              </a:r>
+              <a:r>
+                <a:rPr lang="en-US" sz="1000" dirty="0" smtClean="0"/>
+                <a:t> profiles</a:t>
+              </a:r>
+              <a:endParaRPr lang="en-US" sz="1000" dirty="0"/>
+            </a:p>
+          </p:txBody>
+        </p:sp>
+        <p:sp>
+          <p:nvSpPr>
+            <p:cNvPr id="10" name="Rounded Rectangle 9"/>
+            <p:cNvSpPr/>
+            <p:nvPr/>
+          </p:nvSpPr>
+          <p:spPr>
+            <a:xfrm>
+              <a:off x="5241634" y="4916316"/>
+              <a:ext cx="1429966" cy="476655"/>
+            </a:xfrm>
+            <a:prstGeom prst="roundRect">
+              <a:avLst/>
+            </a:prstGeom>
+            <a:solidFill>
+              <a:srgbClr val="0070C0"/>
+            </a:solidFill>
+            <a:ln>
+              <a:noFill/>
+            </a:ln>
+          </p:spPr>
+          <p:style>
+            <a:lnRef idx="2">
+              <a:schemeClr val="accent1">
+                <a:shade val="50000"/>
+              </a:schemeClr>
+            </a:lnRef>
+            <a:fillRef idx="1">
+              <a:schemeClr val="accent1"/>
+            </a:fillRef>
+            <a:effectRef idx="0">
+              <a:schemeClr val="accent1"/>
+            </a:effectRef>
+            <a:fontRef idx="minor">
+              <a:schemeClr val="lt1"/>
+            </a:fontRef>
+          </p:style>
+          <p:txBody>
+            <a:bodyPr rtlCol="0" anchor="ctr"/>
+            <a:lstStyle/>
+            <a:p>
+              <a:pPr algn="ctr"/>
+              <a:r>
+                <a:rPr lang="en-US" sz="1200" dirty="0"/>
+                <a:t>Display </a:t>
+              </a:r>
+              <a:r>
+                <a:rPr lang="en-US" sz="1200" dirty="0" smtClean="0"/>
+                <a:t>Google Search results</a:t>
+              </a:r>
+              <a:endParaRPr lang="en-US" sz="1200" dirty="0"/>
+            </a:p>
+          </p:txBody>
+        </p:sp>
+        <p:sp>
+          <p:nvSpPr>
+            <p:cNvPr id="11" name="Diamond 10"/>
+            <p:cNvSpPr/>
+            <p:nvPr/>
+          </p:nvSpPr>
+          <p:spPr>
+            <a:xfrm>
+              <a:off x="5175512" y="2643986"/>
+              <a:ext cx="1562211" cy="1562211"/>
+            </a:xfrm>
+            <a:prstGeom prst="diamond">
+              <a:avLst/>
+            </a:prstGeom>
+            <a:solidFill>
+              <a:srgbClr val="00B050"/>
+            </a:solidFill>
+            <a:ln>
+              <a:noFill/>
+            </a:ln>
+          </p:spPr>
+          <p:style>
+            <a:lnRef idx="2">
+              <a:schemeClr val="accent1">
+                <a:shade val="50000"/>
+              </a:schemeClr>
+            </a:lnRef>
+            <a:fillRef idx="1">
+              <a:schemeClr val="accent1"/>
+            </a:fillRef>
+            <a:effectRef idx="0">
+              <a:schemeClr val="accent1"/>
+            </a:effectRef>
+            <a:fontRef idx="minor">
+              <a:schemeClr val="lt1"/>
+            </a:fontRef>
+          </p:style>
+          <p:txBody>
+            <a:bodyPr rtlCol="0" anchor="ctr"/>
+            <a:lstStyle/>
+            <a:p>
+              <a:pPr algn="ctr"/>
+              <a:r>
+                <a:rPr lang="en-US" sz="1200" dirty="0"/>
+                <a:t>p</a:t>
+              </a:r>
+              <a:r>
+                <a:rPr lang="en-US" sz="1200" dirty="0" smtClean="0"/>
+                <a:t>age </a:t>
+              </a:r>
+            </a:p>
+            <a:p>
+              <a:pPr algn="ctr"/>
+              <a:r>
+                <a:rPr lang="en-US" sz="1200" dirty="0" smtClean="0"/>
+                <a:t>== </a:t>
+              </a:r>
+              <a:r>
+                <a:rPr lang="en-US" sz="1200" dirty="0" smtClean="0"/>
+                <a:t>google maps</a:t>
+              </a:r>
+              <a:endParaRPr lang="en-US" sz="1200" dirty="0"/>
+            </a:p>
+          </p:txBody>
+        </p:sp>
+        <p:sp>
+          <p:nvSpPr>
+            <p:cNvPr id="12" name="TextBox 11"/>
+            <p:cNvSpPr txBox="1"/>
+            <p:nvPr/>
+          </p:nvSpPr>
+          <p:spPr>
+            <a:xfrm>
+              <a:off x="6852734" y="1066753"/>
+              <a:ext cx="508537" cy="307777"/>
+            </a:xfrm>
+            <a:prstGeom prst="rect">
+              <a:avLst/>
+            </a:prstGeom>
+            <a:noFill/>
+          </p:spPr>
+          <p:txBody>
+            <a:bodyPr wrap="none" rtlCol="0">
+              <a:spAutoFit/>
+            </a:bodyPr>
+            <a:lstStyle/>
+            <a:p>
+              <a:r>
+                <a:rPr lang="en-US" sz="1400" dirty="0" smtClean="0"/>
+                <a:t>True</a:t>
+              </a:r>
+              <a:endParaRPr lang="en-US" sz="1400" dirty="0"/>
+            </a:p>
+          </p:txBody>
+        </p:sp>
+        <p:sp>
+          <p:nvSpPr>
+            <p:cNvPr id="13" name="TextBox 12"/>
+            <p:cNvSpPr txBox="1"/>
+            <p:nvPr/>
+          </p:nvSpPr>
+          <p:spPr>
+            <a:xfrm>
+              <a:off x="6121321" y="2244203"/>
+              <a:ext cx="550279" cy="307777"/>
+            </a:xfrm>
+            <a:prstGeom prst="rect">
+              <a:avLst/>
+            </a:prstGeom>
+            <a:noFill/>
+          </p:spPr>
+          <p:txBody>
+            <a:bodyPr wrap="none" rtlCol="0">
+              <a:spAutoFit/>
+            </a:bodyPr>
+            <a:lstStyle/>
+            <a:p>
+              <a:r>
+                <a:rPr lang="en-US" sz="1400" smtClean="0"/>
+                <a:t>False</a:t>
+              </a:r>
+              <a:endParaRPr lang="en-US" sz="1400"/>
+            </a:p>
+          </p:txBody>
+        </p:sp>
+        <p:cxnSp>
+          <p:nvCxnSpPr>
+            <p:cNvPr id="14" name="Straight Arrow Connector 13"/>
+            <p:cNvCxnSpPr>
+              <a:endCxn id="16" idx="0"/>
+            </p:cNvCxnSpPr>
+            <p:nvPr/>
+          </p:nvCxnSpPr>
+          <p:spPr>
+            <a:xfrm flipH="1">
+              <a:off x="5956618" y="2152198"/>
+              <a:ext cx="45" cy="491788"/>
+            </a:xfrm>
+            <a:prstGeom prst="straightConnector1">
+              <a:avLst/>
+            </a:prstGeom>
+            <a:ln>
+              <a:tailEnd type="triangle"/>
+            </a:ln>
+          </p:spPr>
+          <p:style>
+            <a:lnRef idx="1">
+              <a:schemeClr val="dk1"/>
+            </a:lnRef>
+            <a:fillRef idx="0">
+              <a:schemeClr val="dk1"/>
+            </a:fillRef>
+            <a:effectRef idx="0">
+              <a:schemeClr val="dk1"/>
+            </a:effectRef>
+            <a:fontRef idx="minor">
+              <a:schemeClr val="tx1"/>
+            </a:fontRef>
+          </p:style>
+        </p:cxnSp>
+        <p:sp>
+          <p:nvSpPr>
+            <p:cNvPr id="15" name="Rounded Rectangle 14"/>
+            <p:cNvSpPr/>
+            <p:nvPr/>
+          </p:nvSpPr>
+          <p:spPr>
+            <a:xfrm>
+              <a:off x="7636213" y="3181941"/>
+              <a:ext cx="1429966" cy="476655"/>
+            </a:xfrm>
+            <a:prstGeom prst="roundRect">
+              <a:avLst/>
+            </a:prstGeom>
+            <a:solidFill>
+              <a:srgbClr val="0070C0"/>
+            </a:solidFill>
+            <a:ln>
+              <a:noFill/>
+            </a:ln>
+          </p:spPr>
+          <p:style>
+            <a:lnRef idx="2">
+              <a:schemeClr val="accent1">
+                <a:shade val="50000"/>
+              </a:schemeClr>
+            </a:lnRef>
+            <a:fillRef idx="1">
+              <a:schemeClr val="accent1"/>
+            </a:fillRef>
+            <a:effectRef idx="0">
+              <a:schemeClr val="accent1"/>
+            </a:effectRef>
+            <a:fontRef idx="minor">
+              <a:schemeClr val="lt1"/>
+            </a:fontRef>
+          </p:style>
+          <p:txBody>
+            <a:bodyPr rtlCol="0" anchor="ctr"/>
+            <a:lstStyle/>
+            <a:p>
+              <a:pPr algn="ctr"/>
+              <a:r>
+                <a:rPr lang="en-US" sz="1000" dirty="0" smtClean="0"/>
+                <a:t>Display </a:t>
+              </a:r>
+              <a:r>
+                <a:rPr lang="en-US" sz="1000" dirty="0" smtClean="0"/>
+                <a:t>Google</a:t>
+              </a:r>
+              <a:r>
+                <a:rPr lang="en-US" sz="1000" dirty="0" smtClean="0"/>
+                <a:t> Maps</a:t>
+              </a:r>
+              <a:endParaRPr lang="en-US" sz="1000" dirty="0"/>
+            </a:p>
+          </p:txBody>
+        </p:sp>
+        <p:sp>
+          <p:nvSpPr>
+            <p:cNvPr id="16" name="TextBox 15"/>
+            <p:cNvSpPr txBox="1"/>
+            <p:nvPr/>
+          </p:nvSpPr>
+          <p:spPr>
+            <a:xfrm>
+              <a:off x="6737723" y="3174412"/>
+              <a:ext cx="508537" cy="307777"/>
+            </a:xfrm>
+            <a:prstGeom prst="rect">
+              <a:avLst/>
+            </a:prstGeom>
+            <a:noFill/>
+          </p:spPr>
+          <p:txBody>
+            <a:bodyPr wrap="none" rtlCol="0">
+              <a:spAutoFit/>
+            </a:bodyPr>
+            <a:lstStyle/>
+            <a:p>
+              <a:r>
+                <a:rPr lang="en-US" sz="1400" smtClean="0"/>
+                <a:t>True</a:t>
+              </a:r>
+              <a:endParaRPr lang="en-US" sz="1400"/>
+            </a:p>
+          </p:txBody>
+        </p:sp>
+        <p:cxnSp>
+          <p:nvCxnSpPr>
+            <p:cNvPr id="17" name="Straight Arrow Connector 16"/>
+            <p:cNvCxnSpPr/>
+            <p:nvPr/>
+          </p:nvCxnSpPr>
+          <p:spPr>
+            <a:xfrm flipV="1">
+              <a:off x="6737723" y="3420269"/>
+              <a:ext cx="898490" cy="510"/>
+            </a:xfrm>
+            <a:prstGeom prst="straightConnector1">
+              <a:avLst/>
+            </a:prstGeom>
+            <a:ln>
+              <a:tailEnd type="triangle"/>
+            </a:ln>
+          </p:spPr>
+          <p:style>
+            <a:lnRef idx="1">
+              <a:schemeClr val="dk1"/>
+            </a:lnRef>
+            <a:fillRef idx="0">
+              <a:schemeClr val="dk1"/>
+            </a:fillRef>
+            <a:effectRef idx="0">
+              <a:schemeClr val="dk1"/>
+            </a:effectRef>
+            <a:fontRef idx="minor">
+              <a:schemeClr val="tx1"/>
+            </a:fontRef>
+          </p:style>
+        </p:cxnSp>
+      </p:grpSp>
+    </p:spTree>
+    <p:extLst>
+      <p:ext uri="{BB962C8B-B14F-4D97-AF65-F5344CB8AC3E}">
+        <p14:creationId xmlns:p14="http://schemas.microsoft.com/office/powerpoint/2010/main" val="316596544"/>
       </p:ext>
     </p:extLst>
   </p:cSld>

</xml_diff>